<commit_message>
Furnish Developer Guide with Design Considerations.
</commit_message>
<xml_diff>
--- a/docs/diagrams/HelpClassDiagram.pptx
+++ b/docs/diagrams/HelpClassDiagram.pptx
@@ -5042,13 +5042,15 @@
           </p:cNvPr>
           <p:cNvCxnSpPr>
             <a:cxnSpLocks/>
+            <a:stCxn id="152" idx="1"/>
+            <a:endCxn id="153" idx="3"/>
           </p:cNvCxnSpPr>
           <p:nvPr/>
         </p:nvCxnSpPr>
         <p:spPr>
-          <a:xfrm flipH="1" flipV="1">
-            <a:off x="1529913" y="3186327"/>
-            <a:ext cx="682330" cy="3489"/>
+          <a:xfrm flipV="1">
+            <a:off x="1537309" y="3169661"/>
+            <a:ext cx="622047" cy="7766"/>
           </a:xfrm>
           <a:prstGeom prst="straightConnector1">
             <a:avLst/>

</xml_diff>